<commit_message>
pulling out some console.logs
</commit_message>
<xml_diff>
--- a/BattleBoard.pptx
+++ b/BattleBoard.pptx
@@ -172,7 +172,7 @@
           <a:noFill/>
           <a:extLst>
             <a:ext uri="{909E8E84-426E-40dd-AFC4-6F175D3DCCD1}">
-              <a14:hiddenFill xmlns="" xmlns:a14="http://schemas.microsoft.com/office/drawing/2010/main">
+              <a14:hiddenFill xmlns:a14="http://schemas.microsoft.com/office/drawing/2010/main" xmlns="">
                 <a:solidFill>
                   <a:srgbClr val="FFFFFF"/>
                 </a:solidFill>
@@ -232,7 +232,7 @@
             </a:ln>
             <a:extLst>
               <a:ext uri="{91240B29-F687-4f45-9708-019B960494DF}">
-                <a14:hiddenLine xmlns="" xmlns:a14="http://schemas.microsoft.com/office/drawing/2010/main" w="9525">
+                <a14:hiddenLine xmlns:a14="http://schemas.microsoft.com/office/drawing/2010/main" xmlns="" w="9525">
                   <a:solidFill>
                     <a:srgbClr val="000000"/>
                   </a:solidFill>
@@ -322,7 +322,7 @@
             </a:ln>
             <a:extLst>
               <a:ext uri="{91240B29-F687-4f45-9708-019B960494DF}">
-                <a14:hiddenLine xmlns="" xmlns:a14="http://schemas.microsoft.com/office/drawing/2010/main" w="9525">
+                <a14:hiddenLine xmlns:a14="http://schemas.microsoft.com/office/drawing/2010/main" xmlns="" w="9525">
                   <a:solidFill>
                     <a:srgbClr val="000000"/>
                   </a:solidFill>
@@ -412,7 +412,7 @@
             </a:ln>
             <a:extLst>
               <a:ext uri="{91240B29-F687-4f45-9708-019B960494DF}">
-                <a14:hiddenLine xmlns="" xmlns:a14="http://schemas.microsoft.com/office/drawing/2010/main" w="9525">
+                <a14:hiddenLine xmlns:a14="http://schemas.microsoft.com/office/drawing/2010/main" xmlns="" w="9525">
                   <a:solidFill>
                     <a:srgbClr val="000000"/>
                   </a:solidFill>
@@ -446,7 +446,7 @@
             </a:ln>
             <a:extLst>
               <a:ext uri="{91240B29-F687-4f45-9708-019B960494DF}">
-                <a14:hiddenLine xmlns="" xmlns:a14="http://schemas.microsoft.com/office/drawing/2010/main" w="9525">
+                <a14:hiddenLine xmlns:a14="http://schemas.microsoft.com/office/drawing/2010/main" xmlns="" w="9525">
                   <a:solidFill>
                     <a:srgbClr val="000000"/>
                   </a:solidFill>
@@ -536,7 +536,7 @@
             </a:ln>
             <a:extLst>
               <a:ext uri="{91240B29-F687-4f45-9708-019B960494DF}">
-                <a14:hiddenLine xmlns="" xmlns:a14="http://schemas.microsoft.com/office/drawing/2010/main" w="9525">
+                <a14:hiddenLine xmlns:a14="http://schemas.microsoft.com/office/drawing/2010/main" xmlns="" w="9525">
                   <a:solidFill>
                     <a:srgbClr val="000000"/>
                   </a:solidFill>
@@ -598,7 +598,7 @@
             </a:ln>
             <a:extLst>
               <a:ext uri="{91240B29-F687-4f45-9708-019B960494DF}">
-                <a14:hiddenLine xmlns="" xmlns:a14="http://schemas.microsoft.com/office/drawing/2010/main" w="9525">
+                <a14:hiddenLine xmlns:a14="http://schemas.microsoft.com/office/drawing/2010/main" xmlns="" w="9525">
                   <a:solidFill>
                     <a:srgbClr val="000000"/>
                   </a:solidFill>
@@ -660,7 +660,7 @@
             </a:ln>
             <a:extLst>
               <a:ext uri="{91240B29-F687-4f45-9708-019B960494DF}">
-                <a14:hiddenLine xmlns="" xmlns:a14="http://schemas.microsoft.com/office/drawing/2010/main" w="9525">
+                <a14:hiddenLine xmlns:a14="http://schemas.microsoft.com/office/drawing/2010/main" xmlns="" w="9525">
                   <a:solidFill>
                     <a:srgbClr val="000000"/>
                   </a:solidFill>
@@ -750,7 +750,7 @@
             </a:ln>
             <a:extLst>
               <a:ext uri="{91240B29-F687-4f45-9708-019B960494DF}">
-                <a14:hiddenLine xmlns="" xmlns:a14="http://schemas.microsoft.com/office/drawing/2010/main" w="9525">
+                <a14:hiddenLine xmlns:a14="http://schemas.microsoft.com/office/drawing/2010/main" xmlns="" w="9525">
                   <a:solidFill>
                     <a:srgbClr val="000000"/>
                   </a:solidFill>
@@ -812,7 +812,7 @@
             </a:ln>
             <a:extLst>
               <a:ext uri="{91240B29-F687-4f45-9708-019B960494DF}">
-                <a14:hiddenLine xmlns="" xmlns:a14="http://schemas.microsoft.com/office/drawing/2010/main" w="9525">
+                <a14:hiddenLine xmlns:a14="http://schemas.microsoft.com/office/drawing/2010/main" xmlns="" w="9525">
                   <a:solidFill>
                     <a:srgbClr val="000000"/>
                   </a:solidFill>
@@ -874,7 +874,7 @@
             </a:ln>
             <a:extLst>
               <a:ext uri="{91240B29-F687-4f45-9708-019B960494DF}">
-                <a14:hiddenLine xmlns="" xmlns:a14="http://schemas.microsoft.com/office/drawing/2010/main" w="9525">
+                <a14:hiddenLine xmlns:a14="http://schemas.microsoft.com/office/drawing/2010/main" xmlns="" w="9525">
                   <a:solidFill>
                     <a:srgbClr val="000000"/>
                   </a:solidFill>
@@ -964,7 +964,7 @@
             </a:ln>
             <a:extLst>
               <a:ext uri="{91240B29-F687-4f45-9708-019B960494DF}">
-                <a14:hiddenLine xmlns="" xmlns:a14="http://schemas.microsoft.com/office/drawing/2010/main" w="9525">
+                <a14:hiddenLine xmlns:a14="http://schemas.microsoft.com/office/drawing/2010/main" xmlns="" w="9525">
                   <a:solidFill>
                     <a:srgbClr val="000000"/>
                   </a:solidFill>
@@ -1054,7 +1054,7 @@
             </a:ln>
             <a:extLst>
               <a:ext uri="{91240B29-F687-4f45-9708-019B960494DF}">
-                <a14:hiddenLine xmlns="" xmlns:a14="http://schemas.microsoft.com/office/drawing/2010/main" w="9525">
+                <a14:hiddenLine xmlns:a14="http://schemas.microsoft.com/office/drawing/2010/main" xmlns="" w="9525">
                   <a:solidFill>
                     <a:srgbClr val="000000"/>
                   </a:solidFill>
@@ -1116,7 +1116,7 @@
             </a:ln>
             <a:extLst>
               <a:ext uri="{91240B29-F687-4f45-9708-019B960494DF}">
-                <a14:hiddenLine xmlns="" xmlns:a14="http://schemas.microsoft.com/office/drawing/2010/main" w="9525">
+                <a14:hiddenLine xmlns:a14="http://schemas.microsoft.com/office/drawing/2010/main" xmlns="" w="9525">
                   <a:solidFill>
                     <a:srgbClr val="000000"/>
                   </a:solidFill>
@@ -1226,7 +1226,7 @@
             </a:ln>
             <a:extLst>
               <a:ext uri="{91240B29-F687-4f45-9708-019B960494DF}">
-                <a14:hiddenLine xmlns="" xmlns:a14="http://schemas.microsoft.com/office/drawing/2010/main" w="9525">
+                <a14:hiddenLine xmlns:a14="http://schemas.microsoft.com/office/drawing/2010/main" xmlns="" w="9525">
                   <a:solidFill>
                     <a:srgbClr val="000000"/>
                   </a:solidFill>
@@ -1288,7 +1288,7 @@
             </a:ln>
             <a:extLst>
               <a:ext uri="{91240B29-F687-4f45-9708-019B960494DF}">
-                <a14:hiddenLine xmlns="" xmlns:a14="http://schemas.microsoft.com/office/drawing/2010/main" w="9525">
+                <a14:hiddenLine xmlns:a14="http://schemas.microsoft.com/office/drawing/2010/main" xmlns="" w="9525">
                   <a:solidFill>
                     <a:srgbClr val="000000"/>
                   </a:solidFill>
@@ -1378,7 +1378,7 @@
             </a:ln>
             <a:extLst>
               <a:ext uri="{91240B29-F687-4f45-9708-019B960494DF}">
-                <a14:hiddenLine xmlns="" xmlns:a14="http://schemas.microsoft.com/office/drawing/2010/main" w="9525">
+                <a14:hiddenLine xmlns:a14="http://schemas.microsoft.com/office/drawing/2010/main" xmlns="" w="9525">
                   <a:solidFill>
                     <a:srgbClr val="000000"/>
                   </a:solidFill>
@@ -1468,7 +1468,7 @@
             </a:ln>
             <a:extLst>
               <a:ext uri="{91240B29-F687-4f45-9708-019B960494DF}">
-                <a14:hiddenLine xmlns="" xmlns:a14="http://schemas.microsoft.com/office/drawing/2010/main" w="9525">
+                <a14:hiddenLine xmlns:a14="http://schemas.microsoft.com/office/drawing/2010/main" xmlns="" w="9525">
                   <a:solidFill>
                     <a:srgbClr val="000000"/>
                   </a:solidFill>
@@ -1530,7 +1530,7 @@
             </a:ln>
             <a:extLst>
               <a:ext uri="{91240B29-F687-4f45-9708-019B960494DF}">
-                <a14:hiddenLine xmlns="" xmlns:a14="http://schemas.microsoft.com/office/drawing/2010/main" w="9525">
+                <a14:hiddenLine xmlns:a14="http://schemas.microsoft.com/office/drawing/2010/main" xmlns="" w="9525">
                   <a:solidFill>
                     <a:srgbClr val="000000"/>
                   </a:solidFill>
@@ -1620,7 +1620,7 @@
             </a:ln>
             <a:extLst>
               <a:ext uri="{91240B29-F687-4f45-9708-019B960494DF}">
-                <a14:hiddenLine xmlns="" xmlns:a14="http://schemas.microsoft.com/office/drawing/2010/main" w="9525">
+                <a14:hiddenLine xmlns:a14="http://schemas.microsoft.com/office/drawing/2010/main" xmlns="" w="9525">
                   <a:solidFill>
                     <a:srgbClr val="000000"/>
                   </a:solidFill>
@@ -1710,7 +1710,7 @@
             </a:ln>
             <a:extLst>
               <a:ext uri="{91240B29-F687-4f45-9708-019B960494DF}">
-                <a14:hiddenLine xmlns="" xmlns:a14="http://schemas.microsoft.com/office/drawing/2010/main" w="9525">
+                <a14:hiddenLine xmlns:a14="http://schemas.microsoft.com/office/drawing/2010/main" xmlns="" w="9525">
                   <a:solidFill>
                     <a:srgbClr val="000000"/>
                   </a:solidFill>
@@ -1766,7 +1766,7 @@
             </a:ln>
             <a:extLst>
               <a:ext uri="{91240B29-F687-4f45-9708-019B960494DF}">
-                <a14:hiddenLine xmlns="" xmlns:a14="http://schemas.microsoft.com/office/drawing/2010/main" w="9525">
+                <a14:hiddenLine xmlns:a14="http://schemas.microsoft.com/office/drawing/2010/main" xmlns="" w="9525">
                   <a:solidFill>
                     <a:srgbClr val="000000"/>
                   </a:solidFill>
@@ -1856,7 +1856,7 @@
             </a:ln>
             <a:extLst>
               <a:ext uri="{91240B29-F687-4f45-9708-019B960494DF}">
-                <a14:hiddenLine xmlns="" xmlns:a14="http://schemas.microsoft.com/office/drawing/2010/main" w="9525">
+                <a14:hiddenLine xmlns:a14="http://schemas.microsoft.com/office/drawing/2010/main" xmlns="" w="9525">
                   <a:solidFill>
                     <a:srgbClr val="000000"/>
                   </a:solidFill>
@@ -1912,7 +1912,7 @@
             </a:ln>
             <a:extLst>
               <a:ext uri="{91240B29-F687-4f45-9708-019B960494DF}">
-                <a14:hiddenLine xmlns="" xmlns:a14="http://schemas.microsoft.com/office/drawing/2010/main" w="9525">
+                <a14:hiddenLine xmlns:a14="http://schemas.microsoft.com/office/drawing/2010/main" xmlns="" w="9525">
                   <a:solidFill>
                     <a:srgbClr val="000000"/>
                   </a:solidFill>
@@ -2002,7 +2002,7 @@
             </a:ln>
             <a:extLst>
               <a:ext uri="{91240B29-F687-4f45-9708-019B960494DF}">
-                <a14:hiddenLine xmlns="" xmlns:a14="http://schemas.microsoft.com/office/drawing/2010/main" w="9525">
+                <a14:hiddenLine xmlns:a14="http://schemas.microsoft.com/office/drawing/2010/main" xmlns="" w="9525">
                   <a:solidFill>
                     <a:srgbClr val="000000"/>
                   </a:solidFill>
@@ -2070,7 +2070,7 @@
             </a:ln>
             <a:extLst>
               <a:ext uri="{91240B29-F687-4f45-9708-019B960494DF}">
-                <a14:hiddenLine xmlns="" xmlns:a14="http://schemas.microsoft.com/office/drawing/2010/main" w="9525">
+                <a14:hiddenLine xmlns:a14="http://schemas.microsoft.com/office/drawing/2010/main" xmlns="" w="9525">
                   <a:solidFill>
                     <a:srgbClr val="000000"/>
                   </a:solidFill>
@@ -2160,7 +2160,7 @@
             </a:ln>
             <a:extLst>
               <a:ext uri="{91240B29-F687-4f45-9708-019B960494DF}">
-                <a14:hiddenLine xmlns="" xmlns:a14="http://schemas.microsoft.com/office/drawing/2010/main" w="9525">
+                <a14:hiddenLine xmlns:a14="http://schemas.microsoft.com/office/drawing/2010/main" xmlns="" w="9525">
                   <a:solidFill>
                     <a:srgbClr val="000000"/>
                   </a:solidFill>
@@ -2228,7 +2228,7 @@
             </a:ln>
             <a:extLst>
               <a:ext uri="{91240B29-F687-4f45-9708-019B960494DF}">
-                <a14:hiddenLine xmlns="" xmlns:a14="http://schemas.microsoft.com/office/drawing/2010/main" w="9525">
+                <a14:hiddenLine xmlns:a14="http://schemas.microsoft.com/office/drawing/2010/main" xmlns="" w="9525">
                   <a:solidFill>
                     <a:srgbClr val="000000"/>
                   </a:solidFill>
@@ -2318,7 +2318,7 @@
             </a:ln>
             <a:extLst>
               <a:ext uri="{91240B29-F687-4f45-9708-019B960494DF}">
-                <a14:hiddenLine xmlns="" xmlns:a14="http://schemas.microsoft.com/office/drawing/2010/main" w="9525">
+                <a14:hiddenLine xmlns:a14="http://schemas.microsoft.com/office/drawing/2010/main" xmlns="" w="9525">
                   <a:solidFill>
                     <a:srgbClr val="000000"/>
                   </a:solidFill>
@@ -2352,7 +2352,7 @@
             </a:ln>
             <a:extLst>
               <a:ext uri="{91240B29-F687-4f45-9708-019B960494DF}">
-                <a14:hiddenLine xmlns="" xmlns:a14="http://schemas.microsoft.com/office/drawing/2010/main" w="9525">
+                <a14:hiddenLine xmlns:a14="http://schemas.microsoft.com/office/drawing/2010/main" xmlns="" w="9525">
                   <a:solidFill>
                     <a:srgbClr val="000000"/>
                   </a:solidFill>
@@ -2442,7 +2442,7 @@
             </a:ln>
             <a:extLst>
               <a:ext uri="{91240B29-F687-4f45-9708-019B960494DF}">
-                <a14:hiddenLine xmlns="" xmlns:a14="http://schemas.microsoft.com/office/drawing/2010/main" w="9525">
+                <a14:hiddenLine xmlns:a14="http://schemas.microsoft.com/office/drawing/2010/main" xmlns="" w="9525">
                   <a:solidFill>
                     <a:srgbClr val="000000"/>
                   </a:solidFill>
@@ -2504,7 +2504,7 @@
             </a:ln>
             <a:extLst>
               <a:ext uri="{91240B29-F687-4f45-9708-019B960494DF}">
-                <a14:hiddenLine xmlns="" xmlns:a14="http://schemas.microsoft.com/office/drawing/2010/main" w="9525">
+                <a14:hiddenLine xmlns:a14="http://schemas.microsoft.com/office/drawing/2010/main" xmlns="" w="9525">
                   <a:solidFill>
                     <a:srgbClr val="000000"/>
                   </a:solidFill>
@@ -2566,7 +2566,7 @@
             </a:ln>
             <a:extLst>
               <a:ext uri="{91240B29-F687-4f45-9708-019B960494DF}">
-                <a14:hiddenLine xmlns="" xmlns:a14="http://schemas.microsoft.com/office/drawing/2010/main" w="9525">
+                <a14:hiddenLine xmlns:a14="http://schemas.microsoft.com/office/drawing/2010/main" xmlns="" w="9525">
                   <a:solidFill>
                     <a:srgbClr val="000000"/>
                   </a:solidFill>
@@ -2656,7 +2656,7 @@
             </a:ln>
             <a:extLst>
               <a:ext uri="{91240B29-F687-4f45-9708-019B960494DF}">
-                <a14:hiddenLine xmlns="" xmlns:a14="http://schemas.microsoft.com/office/drawing/2010/main" w="9525">
+                <a14:hiddenLine xmlns:a14="http://schemas.microsoft.com/office/drawing/2010/main" xmlns="" w="9525">
                   <a:solidFill>
                     <a:srgbClr val="000000"/>
                   </a:solidFill>
@@ -2724,7 +2724,7 @@
             </a:ln>
             <a:extLst>
               <a:ext uri="{91240B29-F687-4f45-9708-019B960494DF}">
-                <a14:hiddenLine xmlns="" xmlns:a14="http://schemas.microsoft.com/office/drawing/2010/main" w="9525">
+                <a14:hiddenLine xmlns:a14="http://schemas.microsoft.com/office/drawing/2010/main" xmlns="" w="9525">
                   <a:solidFill>
                     <a:srgbClr val="000000"/>
                   </a:solidFill>
@@ -2786,7 +2786,7 @@
             </a:ln>
             <a:extLst>
               <a:ext uri="{91240B29-F687-4f45-9708-019B960494DF}">
-                <a14:hiddenLine xmlns="" xmlns:a14="http://schemas.microsoft.com/office/drawing/2010/main" w="9525">
+                <a14:hiddenLine xmlns:a14="http://schemas.microsoft.com/office/drawing/2010/main" xmlns="" w="9525">
                   <a:solidFill>
                     <a:srgbClr val="000000"/>
                   </a:solidFill>
@@ -2876,7 +2876,7 @@
             </a:ln>
             <a:extLst>
               <a:ext uri="{91240B29-F687-4f45-9708-019B960494DF}">
-                <a14:hiddenLine xmlns="" xmlns:a14="http://schemas.microsoft.com/office/drawing/2010/main" w="9525">
+                <a14:hiddenLine xmlns:a14="http://schemas.microsoft.com/office/drawing/2010/main" xmlns="" w="9525">
                   <a:solidFill>
                     <a:srgbClr val="000000"/>
                   </a:solidFill>
@@ -2938,7 +2938,7 @@
             </a:ln>
             <a:extLst>
               <a:ext uri="{91240B29-F687-4f45-9708-019B960494DF}">
-                <a14:hiddenLine xmlns="" xmlns:a14="http://schemas.microsoft.com/office/drawing/2010/main" w="9525">
+                <a14:hiddenLine xmlns:a14="http://schemas.microsoft.com/office/drawing/2010/main" xmlns="" w="9525">
                   <a:solidFill>
                     <a:srgbClr val="000000"/>
                   </a:solidFill>
@@ -3028,7 +3028,7 @@
             </a:ln>
             <a:extLst>
               <a:ext uri="{91240B29-F687-4f45-9708-019B960494DF}">
-                <a14:hiddenLine xmlns="" xmlns:a14="http://schemas.microsoft.com/office/drawing/2010/main" w="9525">
+                <a14:hiddenLine xmlns:a14="http://schemas.microsoft.com/office/drawing/2010/main" xmlns="" w="9525">
                   <a:solidFill>
                     <a:srgbClr val="000000"/>
                   </a:solidFill>
@@ -3090,7 +3090,7 @@
             </a:ln>
             <a:extLst>
               <a:ext uri="{91240B29-F687-4f45-9708-019B960494DF}">
-                <a14:hiddenLine xmlns="" xmlns:a14="http://schemas.microsoft.com/office/drawing/2010/main" w="9525">
+                <a14:hiddenLine xmlns:a14="http://schemas.microsoft.com/office/drawing/2010/main" xmlns="" w="9525">
                   <a:solidFill>
                     <a:srgbClr val="000000"/>
                   </a:solidFill>
@@ -3180,7 +3180,7 @@
             </a:ln>
             <a:extLst>
               <a:ext uri="{91240B29-F687-4f45-9708-019B960494DF}">
-                <a14:hiddenLine xmlns="" xmlns:a14="http://schemas.microsoft.com/office/drawing/2010/main" w="9525">
+                <a14:hiddenLine xmlns:a14="http://schemas.microsoft.com/office/drawing/2010/main" xmlns="" w="9525">
                   <a:solidFill>
                     <a:srgbClr val="000000"/>
                   </a:solidFill>
@@ -3214,7 +3214,7 @@
             </a:ln>
             <a:extLst>
               <a:ext uri="{91240B29-F687-4f45-9708-019B960494DF}">
-                <a14:hiddenLine xmlns="" xmlns:a14="http://schemas.microsoft.com/office/drawing/2010/main" w="9525">
+                <a14:hiddenLine xmlns:a14="http://schemas.microsoft.com/office/drawing/2010/main" xmlns="" w="9525">
                   <a:solidFill>
                     <a:srgbClr val="000000"/>
                   </a:solidFill>
@@ -3279,7 +3279,7 @@
             </a:ln>
             <a:extLst>
               <a:ext uri="{91240B29-F687-4f45-9708-019B960494DF}">
-                <a14:hiddenLine xmlns="" xmlns:a14="http://schemas.microsoft.com/office/drawing/2010/main" w="9525">
+                <a14:hiddenLine xmlns:a14="http://schemas.microsoft.com/office/drawing/2010/main" xmlns="" w="9525">
                   <a:solidFill>
                     <a:srgbClr val="000000"/>
                   </a:solidFill>
@@ -3369,7 +3369,7 @@
             </a:ln>
             <a:extLst>
               <a:ext uri="{91240B29-F687-4f45-9708-019B960494DF}">
-                <a14:hiddenLine xmlns="" xmlns:a14="http://schemas.microsoft.com/office/drawing/2010/main" w="9525">
+                <a14:hiddenLine xmlns:a14="http://schemas.microsoft.com/office/drawing/2010/main" xmlns="" w="9525">
                   <a:solidFill>
                     <a:srgbClr val="000000"/>
                   </a:solidFill>
@@ -3431,7 +3431,7 @@
             </a:ln>
             <a:extLst>
               <a:ext uri="{91240B29-F687-4f45-9708-019B960494DF}">
-                <a14:hiddenLine xmlns="" xmlns:a14="http://schemas.microsoft.com/office/drawing/2010/main" w="9525">
+                <a14:hiddenLine xmlns:a14="http://schemas.microsoft.com/office/drawing/2010/main" xmlns="" w="9525">
                   <a:solidFill>
                     <a:srgbClr val="000000"/>
                   </a:solidFill>
@@ -3521,7 +3521,7 @@
             </a:ln>
             <a:extLst>
               <a:ext uri="{91240B29-F687-4f45-9708-019B960494DF}">
-                <a14:hiddenLine xmlns="" xmlns:a14="http://schemas.microsoft.com/office/drawing/2010/main" w="9525">
+                <a14:hiddenLine xmlns:a14="http://schemas.microsoft.com/office/drawing/2010/main" xmlns="" w="9525">
                   <a:solidFill>
                     <a:srgbClr val="000000"/>
                   </a:solidFill>
@@ -3611,7 +3611,7 @@
             </a:ln>
             <a:extLst>
               <a:ext uri="{91240B29-F687-4f45-9708-019B960494DF}">
-                <a14:hiddenLine xmlns="" xmlns:a14="http://schemas.microsoft.com/office/drawing/2010/main" w="9525">
+                <a14:hiddenLine xmlns:a14="http://schemas.microsoft.com/office/drawing/2010/main" xmlns="" w="9525">
                   <a:solidFill>
                     <a:srgbClr val="000000"/>
                   </a:solidFill>
@@ -3676,7 +3676,7 @@
             </a:ln>
             <a:extLst>
               <a:ext uri="{91240B29-F687-4f45-9708-019B960494DF}">
-                <a14:hiddenLine xmlns="" xmlns:a14="http://schemas.microsoft.com/office/drawing/2010/main" w="9525">
+                <a14:hiddenLine xmlns:a14="http://schemas.microsoft.com/office/drawing/2010/main" xmlns="" w="9525">
                   <a:solidFill>
                     <a:srgbClr val="000000"/>
                   </a:solidFill>
@@ -3738,7 +3738,7 @@
             </a:ln>
             <a:extLst>
               <a:ext uri="{91240B29-F687-4f45-9708-019B960494DF}">
-                <a14:hiddenLine xmlns="" xmlns:a14="http://schemas.microsoft.com/office/drawing/2010/main" w="9525">
+                <a14:hiddenLine xmlns:a14="http://schemas.microsoft.com/office/drawing/2010/main" xmlns="" w="9525">
                   <a:solidFill>
                     <a:srgbClr val="000000"/>
                   </a:solidFill>
@@ -3828,7 +3828,7 @@
             </a:ln>
             <a:extLst>
               <a:ext uri="{91240B29-F687-4f45-9708-019B960494DF}">
-                <a14:hiddenLine xmlns="" xmlns:a14="http://schemas.microsoft.com/office/drawing/2010/main" w="9525">
+                <a14:hiddenLine xmlns:a14="http://schemas.microsoft.com/office/drawing/2010/main" xmlns="" w="9525">
                   <a:solidFill>
                     <a:srgbClr val="000000"/>
                   </a:solidFill>
@@ -3918,7 +3918,7 @@
             </a:ln>
             <a:extLst>
               <a:ext uri="{91240B29-F687-4f45-9708-019B960494DF}">
-                <a14:hiddenLine xmlns="" xmlns:a14="http://schemas.microsoft.com/office/drawing/2010/main" w="9525">
+                <a14:hiddenLine xmlns:a14="http://schemas.microsoft.com/office/drawing/2010/main" xmlns="" w="9525">
                   <a:solidFill>
                     <a:srgbClr val="000000"/>
                   </a:solidFill>
@@ -3980,7 +3980,7 @@
             </a:ln>
             <a:extLst>
               <a:ext uri="{91240B29-F687-4f45-9708-019B960494DF}">
-                <a14:hiddenLine xmlns="" xmlns:a14="http://schemas.microsoft.com/office/drawing/2010/main" w="9525">
+                <a14:hiddenLine xmlns:a14="http://schemas.microsoft.com/office/drawing/2010/main" xmlns="" w="9525">
                   <a:solidFill>
                     <a:srgbClr val="000000"/>
                   </a:solidFill>
@@ -4100,7 +4100,7 @@
             </a:ln>
             <a:extLst>
               <a:ext uri="{91240B29-F687-4f45-9708-019B960494DF}">
-                <a14:hiddenLine xmlns="" xmlns:a14="http://schemas.microsoft.com/office/drawing/2010/main" w="9525">
+                <a14:hiddenLine xmlns:a14="http://schemas.microsoft.com/office/drawing/2010/main" xmlns="" w="9525">
                   <a:solidFill>
                     <a:srgbClr val="000000"/>
                   </a:solidFill>
@@ -4168,7 +4168,7 @@
             </a:ln>
             <a:extLst>
               <a:ext uri="{91240B29-F687-4f45-9708-019B960494DF}">
-                <a14:hiddenLine xmlns="" xmlns:a14="http://schemas.microsoft.com/office/drawing/2010/main" w="9525">
+                <a14:hiddenLine xmlns:a14="http://schemas.microsoft.com/office/drawing/2010/main" xmlns="" w="9525">
                   <a:solidFill>
                     <a:srgbClr val="000000"/>
                   </a:solidFill>
@@ -4258,7 +4258,7 @@
             </a:ln>
             <a:extLst>
               <a:ext uri="{91240B29-F687-4f45-9708-019B960494DF}">
-                <a14:hiddenLine xmlns="" xmlns:a14="http://schemas.microsoft.com/office/drawing/2010/main" w="9525">
+                <a14:hiddenLine xmlns:a14="http://schemas.microsoft.com/office/drawing/2010/main" xmlns="" w="9525">
                   <a:solidFill>
                     <a:srgbClr val="000000"/>
                   </a:solidFill>
@@ -8980,7 +8980,7 @@
           <a:noFill/>
           <a:extLst>
             <a:ext uri="{909E8E84-426E-40dd-AFC4-6F175D3DCCD1}">
-              <a14:hiddenFill xmlns="" xmlns:a14="http://schemas.microsoft.com/office/drawing/2010/main">
+              <a14:hiddenFill xmlns:a14="http://schemas.microsoft.com/office/drawing/2010/main" xmlns="">
                 <a:solidFill>
                   <a:srgbClr val="FFFFFF"/>
                 </a:solidFill>
@@ -9054,7 +9054,7 @@
               </a:ln>
               <a:extLst>
                 <a:ext uri="{91240B29-F687-4f45-9708-019B960494DF}">
-                  <a14:hiddenLine xmlns="" xmlns:a14="http://schemas.microsoft.com/office/drawing/2010/main" w="9525">
+                  <a14:hiddenLine xmlns:a14="http://schemas.microsoft.com/office/drawing/2010/main" xmlns="" w="9525">
                     <a:solidFill>
                       <a:srgbClr val="000000"/>
                     </a:solidFill>
@@ -9144,7 +9144,7 @@
               </a:ln>
               <a:extLst>
                 <a:ext uri="{91240B29-F687-4f45-9708-019B960494DF}">
-                  <a14:hiddenLine xmlns="" xmlns:a14="http://schemas.microsoft.com/office/drawing/2010/main" w="9525">
+                  <a14:hiddenLine xmlns:a14="http://schemas.microsoft.com/office/drawing/2010/main" xmlns="" w="9525">
                     <a:solidFill>
                       <a:srgbClr val="000000"/>
                     </a:solidFill>
@@ -9234,7 +9234,7 @@
               </a:ln>
               <a:extLst>
                 <a:ext uri="{91240B29-F687-4f45-9708-019B960494DF}">
-                  <a14:hiddenLine xmlns="" xmlns:a14="http://schemas.microsoft.com/office/drawing/2010/main" w="9525">
+                  <a14:hiddenLine xmlns:a14="http://schemas.microsoft.com/office/drawing/2010/main" xmlns="" w="9525">
                     <a:solidFill>
                       <a:srgbClr val="000000"/>
                     </a:solidFill>
@@ -9296,7 +9296,7 @@
               </a:ln>
               <a:extLst>
                 <a:ext uri="{91240B29-F687-4f45-9708-019B960494DF}">
-                  <a14:hiddenLine xmlns="" xmlns:a14="http://schemas.microsoft.com/office/drawing/2010/main" w="9525">
+                  <a14:hiddenLine xmlns:a14="http://schemas.microsoft.com/office/drawing/2010/main" xmlns="" w="9525">
                     <a:solidFill>
                       <a:srgbClr val="000000"/>
                     </a:solidFill>
@@ -9386,7 +9386,7 @@
               </a:ln>
               <a:extLst>
                 <a:ext uri="{91240B29-F687-4f45-9708-019B960494DF}">
-                  <a14:hiddenLine xmlns="" xmlns:a14="http://schemas.microsoft.com/office/drawing/2010/main" w="9525">
+                  <a14:hiddenLine xmlns:a14="http://schemas.microsoft.com/office/drawing/2010/main" xmlns="" w="9525">
                     <a:solidFill>
                       <a:srgbClr val="000000"/>
                     </a:solidFill>
@@ -9448,7 +9448,7 @@
               </a:ln>
               <a:extLst>
                 <a:ext uri="{91240B29-F687-4f45-9708-019B960494DF}">
-                  <a14:hiddenLine xmlns="" xmlns:a14="http://schemas.microsoft.com/office/drawing/2010/main" w="9525">
+                  <a14:hiddenLine xmlns:a14="http://schemas.microsoft.com/office/drawing/2010/main" xmlns="" w="9525">
                     <a:solidFill>
                       <a:srgbClr val="000000"/>
                     </a:solidFill>
@@ -9510,7 +9510,7 @@
               </a:ln>
               <a:extLst>
                 <a:ext uri="{91240B29-F687-4f45-9708-019B960494DF}">
-                  <a14:hiddenLine xmlns="" xmlns:a14="http://schemas.microsoft.com/office/drawing/2010/main" w="9525">
+                  <a14:hiddenLine xmlns:a14="http://schemas.microsoft.com/office/drawing/2010/main" xmlns="" w="9525">
                     <a:solidFill>
                       <a:srgbClr val="000000"/>
                     </a:solidFill>
@@ -9600,7 +9600,7 @@
               </a:ln>
               <a:extLst>
                 <a:ext uri="{91240B29-F687-4f45-9708-019B960494DF}">
-                  <a14:hiddenLine xmlns="" xmlns:a14="http://schemas.microsoft.com/office/drawing/2010/main" w="9525">
+                  <a14:hiddenLine xmlns:a14="http://schemas.microsoft.com/office/drawing/2010/main" xmlns="" w="9525">
                     <a:solidFill>
                       <a:srgbClr val="000000"/>
                     </a:solidFill>
@@ -9690,7 +9690,7 @@
               </a:ln>
               <a:extLst>
                 <a:ext uri="{91240B29-F687-4f45-9708-019B960494DF}">
-                  <a14:hiddenLine xmlns="" xmlns:a14="http://schemas.microsoft.com/office/drawing/2010/main" w="9525">
+                  <a14:hiddenLine xmlns:a14="http://schemas.microsoft.com/office/drawing/2010/main" xmlns="" w="9525">
                     <a:solidFill>
                       <a:srgbClr val="000000"/>
                     </a:solidFill>
@@ -9752,7 +9752,7 @@
               </a:ln>
               <a:extLst>
                 <a:ext uri="{91240B29-F687-4f45-9708-019B960494DF}">
-                  <a14:hiddenLine xmlns="" xmlns:a14="http://schemas.microsoft.com/office/drawing/2010/main" w="9525">
+                  <a14:hiddenLine xmlns:a14="http://schemas.microsoft.com/office/drawing/2010/main" xmlns="" w="9525">
                     <a:solidFill>
                       <a:srgbClr val="000000"/>
                     </a:solidFill>
@@ -9862,7 +9862,7 @@
               </a:ln>
               <a:extLst>
                 <a:ext uri="{91240B29-F687-4f45-9708-019B960494DF}">
-                  <a14:hiddenLine xmlns="" xmlns:a14="http://schemas.microsoft.com/office/drawing/2010/main" w="9525">
+                  <a14:hiddenLine xmlns:a14="http://schemas.microsoft.com/office/drawing/2010/main" xmlns="" w="9525">
                     <a:solidFill>
                       <a:srgbClr val="000000"/>
                     </a:solidFill>
@@ -9946,7 +9946,7 @@
               </a:ln>
               <a:extLst>
                 <a:ext uri="{91240B29-F687-4f45-9708-019B960494DF}">
-                  <a14:hiddenLine xmlns="" xmlns:a14="http://schemas.microsoft.com/office/drawing/2010/main" w="9525">
+                  <a14:hiddenLine xmlns:a14="http://schemas.microsoft.com/office/drawing/2010/main" xmlns="" w="9525">
                     <a:solidFill>
                       <a:srgbClr val="000000"/>
                     </a:solidFill>
@@ -10008,7 +10008,7 @@
               </a:ln>
               <a:extLst>
                 <a:ext uri="{91240B29-F687-4f45-9708-019B960494DF}">
-                  <a14:hiddenLine xmlns="" xmlns:a14="http://schemas.microsoft.com/office/drawing/2010/main" w="9525">
+                  <a14:hiddenLine xmlns:a14="http://schemas.microsoft.com/office/drawing/2010/main" xmlns="" w="9525">
                     <a:solidFill>
                       <a:srgbClr val="000000"/>
                     </a:solidFill>
@@ -10070,7 +10070,7 @@
               </a:ln>
               <a:extLst>
                 <a:ext uri="{91240B29-F687-4f45-9708-019B960494DF}">
-                  <a14:hiddenLine xmlns="" xmlns:a14="http://schemas.microsoft.com/office/drawing/2010/main" w="9525">
+                  <a14:hiddenLine xmlns:a14="http://schemas.microsoft.com/office/drawing/2010/main" xmlns="" w="9525">
                     <a:solidFill>
                       <a:srgbClr val="000000"/>
                     </a:solidFill>
@@ -10160,7 +10160,7 @@
               </a:ln>
               <a:extLst>
                 <a:ext uri="{91240B29-F687-4f45-9708-019B960494DF}">
-                  <a14:hiddenLine xmlns="" xmlns:a14="http://schemas.microsoft.com/office/drawing/2010/main" w="9525">
+                  <a14:hiddenLine xmlns:a14="http://schemas.microsoft.com/office/drawing/2010/main" xmlns="" w="9525">
                     <a:solidFill>
                       <a:srgbClr val="000000"/>
                     </a:solidFill>
@@ -10194,7 +10194,7 @@
               </a:ln>
               <a:extLst>
                 <a:ext uri="{91240B29-F687-4f45-9708-019B960494DF}">
-                  <a14:hiddenLine xmlns="" xmlns:a14="http://schemas.microsoft.com/office/drawing/2010/main" w="9525">
+                  <a14:hiddenLine xmlns:a14="http://schemas.microsoft.com/office/drawing/2010/main" xmlns="" w="9525">
                     <a:solidFill>
                       <a:srgbClr val="000000"/>
                     </a:solidFill>
@@ -10259,7 +10259,7 @@
               </a:ln>
               <a:extLst>
                 <a:ext uri="{91240B29-F687-4f45-9708-019B960494DF}">
-                  <a14:hiddenLine xmlns="" xmlns:a14="http://schemas.microsoft.com/office/drawing/2010/main" w="9525">
+                  <a14:hiddenLine xmlns:a14="http://schemas.microsoft.com/office/drawing/2010/main" xmlns="" w="9525">
                     <a:solidFill>
                       <a:srgbClr val="000000"/>
                     </a:solidFill>
@@ -10349,7 +10349,7 @@
               </a:ln>
               <a:extLst>
                 <a:ext uri="{91240B29-F687-4f45-9708-019B960494DF}">
-                  <a14:hiddenLine xmlns="" xmlns:a14="http://schemas.microsoft.com/office/drawing/2010/main" w="9525">
+                  <a14:hiddenLine xmlns:a14="http://schemas.microsoft.com/office/drawing/2010/main" xmlns="" w="9525">
                     <a:solidFill>
                       <a:srgbClr val="000000"/>
                     </a:solidFill>
@@ -10411,7 +10411,7 @@
               </a:ln>
               <a:extLst>
                 <a:ext uri="{91240B29-F687-4f45-9708-019B960494DF}">
-                  <a14:hiddenLine xmlns="" xmlns:a14="http://schemas.microsoft.com/office/drawing/2010/main" w="9525">
+                  <a14:hiddenLine xmlns:a14="http://schemas.microsoft.com/office/drawing/2010/main" xmlns="" w="9525">
                     <a:solidFill>
                       <a:srgbClr val="000000"/>
                     </a:solidFill>
@@ -10501,7 +10501,7 @@
               </a:ln>
               <a:extLst>
                 <a:ext uri="{91240B29-F687-4f45-9708-019B960494DF}">
-                  <a14:hiddenLine xmlns="" xmlns:a14="http://schemas.microsoft.com/office/drawing/2010/main" w="9525">
+                  <a14:hiddenLine xmlns:a14="http://schemas.microsoft.com/office/drawing/2010/main" xmlns="" w="9525">
                     <a:solidFill>
                       <a:srgbClr val="000000"/>
                     </a:solidFill>
@@ -10566,7 +10566,7 @@
               </a:ln>
               <a:extLst>
                 <a:ext uri="{91240B29-F687-4f45-9708-019B960494DF}">
-                  <a14:hiddenLine xmlns="" xmlns:a14="http://schemas.microsoft.com/office/drawing/2010/main" w="9525">
+                  <a14:hiddenLine xmlns:a14="http://schemas.microsoft.com/office/drawing/2010/main" xmlns="" w="9525">
                     <a:solidFill>
                       <a:srgbClr val="000000"/>
                     </a:solidFill>
@@ -10628,7 +10628,7 @@
               </a:ln>
               <a:extLst>
                 <a:ext uri="{91240B29-F687-4f45-9708-019B960494DF}">
-                  <a14:hiddenLine xmlns="" xmlns:a14="http://schemas.microsoft.com/office/drawing/2010/main" w="9525">
+                  <a14:hiddenLine xmlns:a14="http://schemas.microsoft.com/office/drawing/2010/main" xmlns="" w="9525">
                     <a:solidFill>
                       <a:srgbClr val="000000"/>
                     </a:solidFill>
@@ -10718,7 +10718,7 @@
               </a:ln>
               <a:extLst>
                 <a:ext uri="{91240B29-F687-4f45-9708-019B960494DF}">
-                  <a14:hiddenLine xmlns="" xmlns:a14="http://schemas.microsoft.com/office/drawing/2010/main" w="9525">
+                  <a14:hiddenLine xmlns:a14="http://schemas.microsoft.com/office/drawing/2010/main" xmlns="" w="9525">
                     <a:solidFill>
                       <a:srgbClr val="000000"/>
                     </a:solidFill>
@@ -10808,7 +10808,7 @@
               </a:ln>
               <a:extLst>
                 <a:ext uri="{91240B29-F687-4f45-9708-019B960494DF}">
-                  <a14:hiddenLine xmlns="" xmlns:a14="http://schemas.microsoft.com/office/drawing/2010/main" w="9525">
+                  <a14:hiddenLine xmlns:a14="http://schemas.microsoft.com/office/drawing/2010/main" xmlns="" w="9525">
                     <a:solidFill>
                       <a:srgbClr val="000000"/>
                     </a:solidFill>
@@ -10873,7 +10873,7 @@
               </a:ln>
               <a:extLst>
                 <a:ext uri="{91240B29-F687-4f45-9708-019B960494DF}">
-                  <a14:hiddenLine xmlns="" xmlns:a14="http://schemas.microsoft.com/office/drawing/2010/main" w="9525">
+                  <a14:hiddenLine xmlns:a14="http://schemas.microsoft.com/office/drawing/2010/main" xmlns="" w="9525">
                     <a:solidFill>
                       <a:srgbClr val="000000"/>
                     </a:solidFill>
@@ -10993,7 +10993,7 @@
               </a:ln>
               <a:extLst>
                 <a:ext uri="{91240B29-F687-4f45-9708-019B960494DF}">
-                  <a14:hiddenLine xmlns="" xmlns:a14="http://schemas.microsoft.com/office/drawing/2010/main" w="9525">
+                  <a14:hiddenLine xmlns:a14="http://schemas.microsoft.com/office/drawing/2010/main" xmlns="" w="9525">
                     <a:solidFill>
                       <a:srgbClr val="000000"/>
                     </a:solidFill>
@@ -11091,7 +11091,7 @@
               </a:ln>
               <a:extLst>
                 <a:ext uri="{91240B29-F687-4f45-9708-019B960494DF}">
-                  <a14:hiddenLine xmlns="" xmlns:a14="http://schemas.microsoft.com/office/drawing/2010/main" w="9525">
+                  <a14:hiddenLine xmlns:a14="http://schemas.microsoft.com/office/drawing/2010/main" xmlns="" w="9525">
                     <a:solidFill>
                       <a:srgbClr val="000000"/>
                     </a:solidFill>
@@ -11206,7 +11206,7 @@
               </a:ln>
               <a:extLst>
                 <a:ext uri="{91240B29-F687-4f45-9708-019B960494DF}">
-                  <a14:hiddenLine xmlns="" xmlns:a14="http://schemas.microsoft.com/office/drawing/2010/main" w="9525">
+                  <a14:hiddenLine xmlns:a14="http://schemas.microsoft.com/office/drawing/2010/main" xmlns="" w="9525">
                     <a:solidFill>
                       <a:srgbClr val="000000"/>
                     </a:solidFill>
@@ -11296,7 +11296,7 @@
               </a:ln>
               <a:extLst>
                 <a:ext uri="{91240B29-F687-4f45-9708-019B960494DF}">
-                  <a14:hiddenLine xmlns="" xmlns:a14="http://schemas.microsoft.com/office/drawing/2010/main" w="9525">
+                  <a14:hiddenLine xmlns:a14="http://schemas.microsoft.com/office/drawing/2010/main" xmlns="" w="9525">
                     <a:solidFill>
                       <a:srgbClr val="000000"/>
                     </a:solidFill>
@@ -11361,7 +11361,7 @@
               </a:ln>
               <a:extLst>
                 <a:ext uri="{91240B29-F687-4f45-9708-019B960494DF}">
-                  <a14:hiddenLine xmlns="" xmlns:a14="http://schemas.microsoft.com/office/drawing/2010/main" w="9525">
+                  <a14:hiddenLine xmlns:a14="http://schemas.microsoft.com/office/drawing/2010/main" xmlns="" w="9525">
                     <a:solidFill>
                       <a:srgbClr val="000000"/>
                     </a:solidFill>
@@ -11451,7 +11451,7 @@
               </a:ln>
               <a:extLst>
                 <a:ext uri="{91240B29-F687-4f45-9708-019B960494DF}">
-                  <a14:hiddenLine xmlns="" xmlns:a14="http://schemas.microsoft.com/office/drawing/2010/main" w="9525">
+                  <a14:hiddenLine xmlns:a14="http://schemas.microsoft.com/office/drawing/2010/main" xmlns="" w="9525">
                     <a:solidFill>
                       <a:srgbClr val="000000"/>
                     </a:solidFill>
@@ -11519,7 +11519,7 @@
               </a:ln>
               <a:extLst>
                 <a:ext uri="{91240B29-F687-4f45-9708-019B960494DF}">
-                  <a14:hiddenLine xmlns="" xmlns:a14="http://schemas.microsoft.com/office/drawing/2010/main" w="9525">
+                  <a14:hiddenLine xmlns:a14="http://schemas.microsoft.com/office/drawing/2010/main" xmlns="" w="9525">
                     <a:solidFill>
                       <a:srgbClr val="000000"/>
                     </a:solidFill>
@@ -11609,7 +11609,7 @@
               </a:ln>
               <a:extLst>
                 <a:ext uri="{91240B29-F687-4f45-9708-019B960494DF}">
-                  <a14:hiddenLine xmlns="" xmlns:a14="http://schemas.microsoft.com/office/drawing/2010/main" w="9525">
+                  <a14:hiddenLine xmlns:a14="http://schemas.microsoft.com/office/drawing/2010/main" xmlns="" w="9525">
                     <a:solidFill>
                       <a:srgbClr val="000000"/>
                     </a:solidFill>
@@ -11677,7 +11677,7 @@
               </a:ln>
               <a:extLst>
                 <a:ext uri="{91240B29-F687-4f45-9708-019B960494DF}">
-                  <a14:hiddenLine xmlns="" xmlns:a14="http://schemas.microsoft.com/office/drawing/2010/main" w="9525">
+                  <a14:hiddenLine xmlns:a14="http://schemas.microsoft.com/office/drawing/2010/main" xmlns="" w="9525">
                     <a:solidFill>
                       <a:srgbClr val="000000"/>
                     </a:solidFill>
@@ -11767,7 +11767,7 @@
               </a:ln>
               <a:extLst>
                 <a:ext uri="{91240B29-F687-4f45-9708-019B960494DF}">
-                  <a14:hiddenLine xmlns="" xmlns:a14="http://schemas.microsoft.com/office/drawing/2010/main" w="9525">
+                  <a14:hiddenLine xmlns:a14="http://schemas.microsoft.com/office/drawing/2010/main" xmlns="" w="9525">
                     <a:solidFill>
                       <a:srgbClr val="000000"/>
                     </a:solidFill>
@@ -11801,7 +11801,7 @@
               </a:ln>
               <a:extLst>
                 <a:ext uri="{91240B29-F687-4f45-9708-019B960494DF}">
-                  <a14:hiddenLine xmlns="" xmlns:a14="http://schemas.microsoft.com/office/drawing/2010/main" w="9525">
+                  <a14:hiddenLine xmlns:a14="http://schemas.microsoft.com/office/drawing/2010/main" xmlns="" w="9525">
                     <a:solidFill>
                       <a:srgbClr val="000000"/>
                     </a:solidFill>
@@ -12540,7 +12540,7 @@
           <a:p>
             <a:r>
               <a:rPr lang="en-US" dirty="0"/>
-              <a:t>RICHARD SELZNICK: LOGIN PROCESS</a:t>
+              <a:t>RICHARD SELZNICK: LOGIN PROCESS, ROUTES</a:t>
             </a:r>
           </a:p>
           <a:p>
@@ -13149,10 +13149,23 @@
             <p:ph idx="1"/>
           </p:nvPr>
         </p:nvSpPr>
-        <p:spPr/>
+        <p:spPr>
+          <a:xfrm>
+            <a:off x="1141412" y="1863213"/>
+            <a:ext cx="9905999" cy="3927988"/>
+          </a:xfrm>
+        </p:spPr>
         <p:txBody>
-          <a:bodyPr/>
+          <a:bodyPr>
+            <a:normAutofit/>
+          </a:bodyPr>
           <a:lstStyle/>
+          <a:p>
+            <a:r>
+              <a:rPr lang="en-US" dirty="0"/>
+              <a:t>Data validation</a:t>
+            </a:r>
+          </a:p>
           <a:p>
             <a:r>
               <a:rPr lang="en-US" dirty="0"/>
@@ -13174,13 +13187,8 @@
           <a:p>
             <a:r>
               <a:rPr lang="en-US" dirty="0"/>
-              <a:t>Update board </a:t>
+              <a:t>Update board through socket</a:t>
             </a:r>
-            <a:r>
-              <a:rPr lang="en-US"/>
-              <a:t>through socket</a:t>
-            </a:r>
-            <a:endParaRPr lang="en-US" dirty="0"/>
           </a:p>
           <a:p>
             <a:r>

</xml_diff>